<commit_message>
final touch for the english presentation
</commit_message>
<xml_diff>
--- a/EN/GIT.pptx
+++ b/EN/GIT.pptx
@@ -4756,48 +4756,9 @@
         <p:spPr/>
         <p:txBody>
           <a:bodyPr>
-            <a:normAutofit lnSpcReduction="10000"/>
+            <a:normAutofit/>
           </a:bodyPr>
           <a:lstStyle/>
-          <a:p>
-            <a:pPr marL="0" indent="0" algn="ctr">
-              <a:buNone/>
-            </a:pPr>
-            <a:r>
-              <a:rPr lang="en-GB" dirty="0"/>
-              <a:t>Allows parallel versions</a:t>
-            </a:r>
-          </a:p>
-          <a:p>
-            <a:pPr marL="0" indent="0" algn="ctr">
-              <a:buNone/>
-            </a:pPr>
-            <a:endParaRPr lang="en-GB" dirty="0"/>
-          </a:p>
-          <a:p>
-            <a:pPr marL="0" indent="0" algn="ctr">
-              <a:buNone/>
-            </a:pPr>
-            <a:r>
-              <a:rPr lang="en-GB" b="1" dirty="0"/>
-              <a:t>Example:</a:t>
-            </a:r>
-          </a:p>
-          <a:p>
-            <a:pPr marL="0" indent="0" algn="ctr">
-              <a:buNone/>
-            </a:pPr>
-            <a:r>
-              <a:rPr lang="en-GB" dirty="0"/>
-              <a:t>Feature Branches</a:t>
-            </a:r>
-          </a:p>
-          <a:p>
-            <a:pPr marL="0" indent="0" algn="ctr">
-              <a:buNone/>
-            </a:pPr>
-            <a:endParaRPr lang="en-GB" dirty="0"/>
-          </a:p>
           <a:p>
             <a:pPr marL="0" indent="0" algn="ctr">
               <a:buNone/>
@@ -6673,7 +6634,7 @@
             <a:pPr algn="ctr"/>
             <a:r>
               <a:rPr lang="de-AT" dirty="0"/>
-              <a:t>Quellen</a:t>
+              <a:t>Sources</a:t>
             </a:r>
           </a:p>
         </p:txBody>
@@ -6694,14 +6655,19 @@
             <p:ph idx="1"/>
           </p:nvPr>
         </p:nvSpPr>
-        <p:spPr/>
+        <p:spPr>
+          <a:xfrm>
+            <a:off x="4741777" y="2237804"/>
+            <a:ext cx="7576057" cy="2382391"/>
+          </a:xfrm>
+        </p:spPr>
         <p:txBody>
           <a:bodyPr>
-            <a:normAutofit/>
+            <a:normAutofit fontScale="92500" lnSpcReduction="20000"/>
           </a:bodyPr>
           <a:lstStyle/>
           <a:p>
-            <a:pPr marL="0" indent="0" algn="ctr">
+            <a:pPr marL="0" indent="0">
               <a:buNone/>
             </a:pPr>
             <a:r>
@@ -6710,7 +6676,7 @@
             </a:r>
           </a:p>
           <a:p>
-            <a:pPr marL="0" indent="0" algn="ctr">
+            <a:pPr marL="0" indent="0">
               <a:buNone/>
             </a:pPr>
             <a:r>
@@ -6719,7 +6685,7 @@
             </a:r>
           </a:p>
           <a:p>
-            <a:pPr marL="0" indent="0" algn="ctr">
+            <a:pPr marL="0" indent="0">
               <a:buNone/>
             </a:pPr>
             <a:r>
@@ -6728,7 +6694,7 @@
             </a:r>
           </a:p>
           <a:p>
-            <a:pPr marL="0" indent="0" algn="ctr">
+            <a:pPr marL="0" indent="0">
               <a:buNone/>
             </a:pPr>
             <a:r>
@@ -6737,7 +6703,7 @@
             </a:r>
           </a:p>
           <a:p>
-            <a:pPr marL="0" indent="0" algn="ctr">
+            <a:pPr marL="0" indent="0">
               <a:buNone/>
             </a:pPr>
             <a:r>
@@ -6746,19 +6712,73 @@
             </a:r>
           </a:p>
           <a:p>
-            <a:pPr marL="0" indent="0" algn="ctr">
+            <a:pPr marL="0" indent="0">
+              <a:buNone/>
+            </a:pPr>
+            <a:r>
+              <a:rPr lang="de-AT" sz="2000" dirty="0"/>
+              <a:t>https://openhub.net/repositories/compare</a:t>
+            </a:r>
+          </a:p>
+          <a:p>
+            <a:pPr marL="0" indent="0">
+              <a:buNone/>
+            </a:pPr>
+            <a:r>
+              <a:rPr lang="de-AT" sz="2000" dirty="0"/>
+              <a:t>https://xkcd.com/1597/</a:t>
+            </a:r>
+          </a:p>
+          <a:p>
+            <a:pPr marL="0" indent="0">
               <a:buNone/>
             </a:pPr>
             <a:endParaRPr lang="de-AT" sz="2000" dirty="0"/>
           </a:p>
           <a:p>
-            <a:pPr marL="0" indent="0" algn="ctr">
+            <a:pPr marL="0" indent="0">
               <a:buNone/>
             </a:pPr>
             <a:endParaRPr lang="de-AT" sz="2000" dirty="0"/>
           </a:p>
         </p:txBody>
       </p:sp>
+      <p:pic>
+        <p:nvPicPr>
+          <p:cNvPr id="5" name="Picture 4" descr="A cartoon of people looking at a computer&#10;&#10;Description automatically generated">
+            <a:extLst>
+              <a:ext uri="{FF2B5EF4-FFF2-40B4-BE49-F238E27FC236}">
+                <a16:creationId xmlns:a16="http://schemas.microsoft.com/office/drawing/2014/main" id="{4F439E45-F51F-9BDA-4F1D-428F064CE78E}"/>
+              </a:ext>
+            </a:extLst>
+          </p:cNvPr>
+          <p:cNvPicPr>
+            <a:picLocks noChangeAspect="1"/>
+          </p:cNvPicPr>
+          <p:nvPr/>
+        </p:nvPicPr>
+        <p:blipFill>
+          <a:blip r:embed="rId2">
+            <a:extLst>
+              <a:ext uri="{28A0092B-C50C-407E-A947-70E740481C1C}">
+                <a14:useLocalDpi xmlns:a14="http://schemas.microsoft.com/office/drawing/2010/main" val="0"/>
+              </a:ext>
+            </a:extLst>
+          </a:blip>
+          <a:stretch>
+            <a:fillRect/>
+          </a:stretch>
+        </p:blipFill>
+        <p:spPr>
+          <a:xfrm>
+            <a:off x="0" y="0"/>
+            <a:ext cx="4741777" cy="6858000"/>
+          </a:xfrm>
+          <a:prstGeom prst="rect">
+            <a:avLst/>
+          </a:prstGeom>
+        </p:spPr>
+      </p:pic>
     </p:spTree>
     <p:extLst>
       <p:ext uri="{BB962C8B-B14F-4D97-AF65-F5344CB8AC3E}">
@@ -7048,22 +7068,57 @@
             <a:pPr algn="ctr"/>
             <a:r>
               <a:rPr lang="en-US" dirty="0"/>
-              <a:t>Git - Domination</a:t>
+              <a:t>Git – Domination(In Open Source)</a:t>
+            </a:r>
+          </a:p>
+        </p:txBody>
+      </p:sp>
+      <p:sp>
+        <p:nvSpPr>
+          <p:cNvPr id="7" name="TextBox 6">
+            <a:extLst>
+              <a:ext uri="{FF2B5EF4-FFF2-40B4-BE49-F238E27FC236}">
+                <a16:creationId xmlns:a16="http://schemas.microsoft.com/office/drawing/2014/main" id="{86015F67-F1BE-A364-461E-F2AA7824887A}"/>
+              </a:ext>
+            </a:extLst>
+          </p:cNvPr>
+          <p:cNvSpPr txBox="1"/>
+          <p:nvPr/>
+        </p:nvSpPr>
+        <p:spPr>
+          <a:xfrm>
+            <a:off x="1480" y="6488668"/>
+            <a:ext cx="6094520" cy="369332"/>
+          </a:xfrm>
+          <a:prstGeom prst="rect">
+            <a:avLst/>
+          </a:prstGeom>
+          <a:noFill/>
+        </p:spPr>
+        <p:txBody>
+          <a:bodyPr wrap="square">
+            <a:spAutoFit/>
+          </a:bodyPr>
+          <a:lstStyle/>
+          <a:p>
+            <a:r>
+              <a:rPr lang="de-AT" dirty="0"/>
+              <a:t>https://openhub.net/repositories/compare</a:t>
             </a:r>
           </a:p>
         </p:txBody>
       </p:sp>
       <p:pic>
         <p:nvPicPr>
-          <p:cNvPr id="4" name="Grafik 3" descr="Ein Bild, das Screenshot, Text, Schrift, Zahl enthält.&#10;&#10;Automatisch generierte Beschreibung">
+          <p:cNvPr id="1026" name="Picture 2">
             <a:extLst>
               <a:ext uri="{FF2B5EF4-FFF2-40B4-BE49-F238E27FC236}">
-                <a16:creationId xmlns:a16="http://schemas.microsoft.com/office/drawing/2014/main" id="{5A780290-3B28-2330-D8C2-D5EC3FCC45DF}"/>
+                <a16:creationId xmlns:a16="http://schemas.microsoft.com/office/drawing/2014/main" id="{23882690-FF82-8F43-E8E1-2E0EB971D46B}"/>
               </a:ext>
             </a:extLst>
           </p:cNvPr>
           <p:cNvPicPr>
-            <a:picLocks noChangeAspect="1"/>
+            <a:picLocks noChangeAspect="1" noChangeArrowheads="1"/>
           </p:cNvPicPr>
           <p:nvPr/>
         </p:nvPicPr>
@@ -7082,16 +7137,22 @@
         </p:blipFill>
         <p:spPr bwMode="auto">
           <a:xfrm>
-            <a:off x="1271853" y="2753636"/>
-            <a:ext cx="9908570" cy="2092683"/>
+            <a:off x="3220640" y="1690688"/>
+            <a:ext cx="5750719" cy="4600575"/>
           </a:xfrm>
           <a:prstGeom prst="rect">
             <a:avLst/>
           </a:prstGeom>
           <a:noFill/>
-          <a:ln>
-            <a:noFill/>
-          </a:ln>
+          <a:extLst>
+            <a:ext uri="{909E8E84-426E-40DD-AFC4-6F175D3DCCD1}">
+              <a14:hiddenFill xmlns:a14="http://schemas.microsoft.com/office/drawing/2010/main">
+                <a:solidFill>
+                  <a:srgbClr val="FFFFFF"/>
+                </a:solidFill>
+              </a14:hiddenFill>
+            </a:ext>
+          </a:extLst>
         </p:spPr>
       </p:pic>
     </p:spTree>

</xml_diff>